<commit_message>
Update Questions on Diagram
</commit_message>
<xml_diff>
--- a/documentation/system_architecture.pptx
+++ b/documentation/system_architecture.pptx
@@ -106,6 +106,11 @@
       </a:defRPr>
     </a:lvl9pPr>
   </p:defaultTextStyle>
+  <p:extLst>
+    <p:ext uri="{EFAFB233-063F-42B5-8137-9DF3F51BA10A}">
+      <p15:sldGuideLst xmlns:p15="http://schemas.microsoft.com/office/powerpoint/2012/main"/>
+    </p:ext>
+  </p:extLst>
 </p:presentation>
 </file>
 
@@ -240,7 +245,7 @@
           <a:p>
             <a:fld id="{D3EAD725-27B8-4F5F-8F66-A02424069269}" type="datetimeFigureOut">
               <a:rPr lang="en-GB" smtClean="0"/>
-              <a:t>05/07/2021</a:t>
+              <a:t>07/07/2021</a:t>
             </a:fld>
             <a:endParaRPr lang="en-GB" dirty="0"/>
           </a:p>
@@ -410,7 +415,7 @@
           <a:p>
             <a:fld id="{D3EAD725-27B8-4F5F-8F66-A02424069269}" type="datetimeFigureOut">
               <a:rPr lang="en-GB" smtClean="0"/>
-              <a:t>05/07/2021</a:t>
+              <a:t>07/07/2021</a:t>
             </a:fld>
             <a:endParaRPr lang="en-GB" dirty="0"/>
           </a:p>
@@ -590,7 +595,7 @@
           <a:p>
             <a:fld id="{D3EAD725-27B8-4F5F-8F66-A02424069269}" type="datetimeFigureOut">
               <a:rPr lang="en-GB" smtClean="0"/>
-              <a:t>05/07/2021</a:t>
+              <a:t>07/07/2021</a:t>
             </a:fld>
             <a:endParaRPr lang="en-GB" dirty="0"/>
           </a:p>
@@ -760,7 +765,7 @@
           <a:p>
             <a:fld id="{D3EAD725-27B8-4F5F-8F66-A02424069269}" type="datetimeFigureOut">
               <a:rPr lang="en-GB" smtClean="0"/>
-              <a:t>05/07/2021</a:t>
+              <a:t>07/07/2021</a:t>
             </a:fld>
             <a:endParaRPr lang="en-GB" dirty="0"/>
           </a:p>
@@ -1006,7 +1011,7 @@
           <a:p>
             <a:fld id="{D3EAD725-27B8-4F5F-8F66-A02424069269}" type="datetimeFigureOut">
               <a:rPr lang="en-GB" smtClean="0"/>
-              <a:t>05/07/2021</a:t>
+              <a:t>07/07/2021</a:t>
             </a:fld>
             <a:endParaRPr lang="en-GB" dirty="0"/>
           </a:p>
@@ -1238,7 +1243,7 @@
           <a:p>
             <a:fld id="{D3EAD725-27B8-4F5F-8F66-A02424069269}" type="datetimeFigureOut">
               <a:rPr lang="en-GB" smtClean="0"/>
-              <a:t>05/07/2021</a:t>
+              <a:t>07/07/2021</a:t>
             </a:fld>
             <a:endParaRPr lang="en-GB" dirty="0"/>
           </a:p>
@@ -1605,7 +1610,7 @@
           <a:p>
             <a:fld id="{D3EAD725-27B8-4F5F-8F66-A02424069269}" type="datetimeFigureOut">
               <a:rPr lang="en-GB" smtClean="0"/>
-              <a:t>05/07/2021</a:t>
+              <a:t>07/07/2021</a:t>
             </a:fld>
             <a:endParaRPr lang="en-GB" dirty="0"/>
           </a:p>
@@ -1723,7 +1728,7 @@
           <a:p>
             <a:fld id="{D3EAD725-27B8-4F5F-8F66-A02424069269}" type="datetimeFigureOut">
               <a:rPr lang="en-GB" smtClean="0"/>
-              <a:t>05/07/2021</a:t>
+              <a:t>07/07/2021</a:t>
             </a:fld>
             <a:endParaRPr lang="en-GB" dirty="0"/>
           </a:p>
@@ -1818,7 +1823,7 @@
           <a:p>
             <a:fld id="{D3EAD725-27B8-4F5F-8F66-A02424069269}" type="datetimeFigureOut">
               <a:rPr lang="en-GB" smtClean="0"/>
-              <a:t>05/07/2021</a:t>
+              <a:t>07/07/2021</a:t>
             </a:fld>
             <a:endParaRPr lang="en-GB" dirty="0"/>
           </a:p>
@@ -2095,7 +2100,7 @@
           <a:p>
             <a:fld id="{D3EAD725-27B8-4F5F-8F66-A02424069269}" type="datetimeFigureOut">
               <a:rPr lang="en-GB" smtClean="0"/>
-              <a:t>05/07/2021</a:t>
+              <a:t>07/07/2021</a:t>
             </a:fld>
             <a:endParaRPr lang="en-GB" dirty="0"/>
           </a:p>
@@ -2351,7 +2356,7 @@
           <a:p>
             <a:fld id="{D3EAD725-27B8-4F5F-8F66-A02424069269}" type="datetimeFigureOut">
               <a:rPr lang="en-GB" smtClean="0"/>
-              <a:t>05/07/2021</a:t>
+              <a:t>07/07/2021</a:t>
             </a:fld>
             <a:endParaRPr lang="en-GB" dirty="0"/>
           </a:p>
@@ -2564,7 +2569,7 @@
           <a:p>
             <a:fld id="{D3EAD725-27B8-4F5F-8F66-A02424069269}" type="datetimeFigureOut">
               <a:rPr lang="en-GB" smtClean="0"/>
-              <a:t>05/07/2021</a:t>
+              <a:t>07/07/2021</a:t>
             </a:fld>
             <a:endParaRPr lang="en-GB" dirty="0"/>
           </a:p>
@@ -4019,8 +4024,8 @@
         </p:nvSpPr>
         <p:spPr>
           <a:xfrm>
-            <a:off x="7177518" y="3247310"/>
-            <a:ext cx="5014482" cy="2617544"/>
+            <a:off x="7177518" y="3165530"/>
+            <a:ext cx="5014482" cy="2793568"/>
           </a:xfrm>
           <a:prstGeom prst="rect">
             <a:avLst/>
@@ -4110,12 +4115,13 @@
               <a:buChar char="-"/>
             </a:pPr>
             <a:r>
-              <a:rPr lang="en-GB" sz="1100" i="1" dirty="0"/>
-              <a:t>“How much did you enjoy this level?” </a:t>
-            </a:r>
-            <a:r>
-              <a:rPr lang="en-GB" sz="1100" dirty="0"/>
-              <a:t>[out of 5]</a:t>
+              <a:rPr lang="en-GB" sz="1000" b="0" i="0" dirty="0">
+                <a:solidFill>
+                  <a:schemeClr val="bg1"/>
+                </a:solidFill>
+                <a:effectLst/>
+              </a:rPr>
+              <a:t>How engaged did you feel playing this level? [1 - 5] </a:t>
             </a:r>
           </a:p>
           <a:p>
@@ -4124,16 +4130,40 @@
               <a:buChar char="-"/>
             </a:pPr>
             <a:r>
-              <a:rPr lang="en-GB" sz="1100" i="1" dirty="0"/>
-              <a:t>“How different to this level do you want the next level to be?” </a:t>
-            </a:r>
-            <a:r>
-              <a:rPr lang="en-GB" sz="1100" dirty="0"/>
-              <a:t>[out of 5]</a:t>
-            </a:r>
-          </a:p>
-          <a:p>
-            <a:endParaRPr lang="en-GB" sz="1200" dirty="0"/>
+              <a:rPr lang="en-GB" sz="1000" b="0" i="0" dirty="0">
+                <a:solidFill>
+                  <a:schemeClr val="bg1"/>
+                </a:solidFill>
+                <a:effectLst/>
+              </a:rPr>
+              <a:t>How novel was this level compared to the levels you previously played? [1-5]</a:t>
+            </a:r>
+          </a:p>
+          <a:p>
+            <a:pPr marL="742950" lvl="1" indent="-285750">
+              <a:buFontTx/>
+              <a:buChar char="-"/>
+            </a:pPr>
+            <a:r>
+              <a:rPr lang="en-GB" sz="1000" b="0" i="0" dirty="0">
+                <a:solidFill>
+                  <a:schemeClr val="bg1"/>
+                </a:solidFill>
+                <a:effectLst/>
+              </a:rPr>
+              <a:t>How novel would you like the next level to be? [1-5]</a:t>
+            </a:r>
+          </a:p>
+          <a:p>
+            <a:pPr marL="742950" lvl="1" indent="-285750">
+              <a:buFontTx/>
+              <a:buChar char="-"/>
+            </a:pPr>
+            <a:endParaRPr lang="en-GB" sz="1000" dirty="0">
+              <a:solidFill>
+                <a:schemeClr val="bg1"/>
+              </a:solidFill>
+            </a:endParaRPr>
           </a:p>
           <a:p>
             <a:r>
@@ -6215,8 +6245,8 @@
         </p:nvSpPr>
         <p:spPr>
           <a:xfrm>
-            <a:off x="7177518" y="2285669"/>
-            <a:ext cx="5014482" cy="961639"/>
+            <a:off x="7177518" y="2285670"/>
+            <a:ext cx="5014482" cy="879860"/>
           </a:xfrm>
           <a:prstGeom prst="rect">
             <a:avLst/>

</xml_diff>

<commit_message>
Final Game Jam Push
</commit_message>
<xml_diff>
--- a/documentation/system_architecture.pptx
+++ b/documentation/system_architecture.pptx
@@ -8,6 +8,7 @@
     <p:sldId id="256" r:id="rId2"/>
     <p:sldId id="257" r:id="rId3"/>
     <p:sldId id="258" r:id="rId4"/>
+    <p:sldId id="259" r:id="rId5"/>
   </p:sldIdLst>
   <p:sldSz cx="12192000" cy="6858000"/>
   <p:notesSz cx="6858000" cy="9144000"/>
@@ -245,7 +246,7 @@
           <a:p>
             <a:fld id="{D3EAD725-27B8-4F5F-8F66-A02424069269}" type="datetimeFigureOut">
               <a:rPr lang="en-GB" smtClean="0"/>
-              <a:t>07/07/2021</a:t>
+              <a:t>08/07/2021</a:t>
             </a:fld>
             <a:endParaRPr lang="en-GB" dirty="0"/>
           </a:p>
@@ -415,7 +416,7 @@
           <a:p>
             <a:fld id="{D3EAD725-27B8-4F5F-8F66-A02424069269}" type="datetimeFigureOut">
               <a:rPr lang="en-GB" smtClean="0"/>
-              <a:t>07/07/2021</a:t>
+              <a:t>08/07/2021</a:t>
             </a:fld>
             <a:endParaRPr lang="en-GB" dirty="0"/>
           </a:p>
@@ -595,7 +596,7 @@
           <a:p>
             <a:fld id="{D3EAD725-27B8-4F5F-8F66-A02424069269}" type="datetimeFigureOut">
               <a:rPr lang="en-GB" smtClean="0"/>
-              <a:t>07/07/2021</a:t>
+              <a:t>08/07/2021</a:t>
             </a:fld>
             <a:endParaRPr lang="en-GB" dirty="0"/>
           </a:p>
@@ -765,7 +766,7 @@
           <a:p>
             <a:fld id="{D3EAD725-27B8-4F5F-8F66-A02424069269}" type="datetimeFigureOut">
               <a:rPr lang="en-GB" smtClean="0"/>
-              <a:t>07/07/2021</a:t>
+              <a:t>08/07/2021</a:t>
             </a:fld>
             <a:endParaRPr lang="en-GB" dirty="0"/>
           </a:p>
@@ -1011,7 +1012,7 @@
           <a:p>
             <a:fld id="{D3EAD725-27B8-4F5F-8F66-A02424069269}" type="datetimeFigureOut">
               <a:rPr lang="en-GB" smtClean="0"/>
-              <a:t>07/07/2021</a:t>
+              <a:t>08/07/2021</a:t>
             </a:fld>
             <a:endParaRPr lang="en-GB" dirty="0"/>
           </a:p>
@@ -1243,7 +1244,7 @@
           <a:p>
             <a:fld id="{D3EAD725-27B8-4F5F-8F66-A02424069269}" type="datetimeFigureOut">
               <a:rPr lang="en-GB" smtClean="0"/>
-              <a:t>07/07/2021</a:t>
+              <a:t>08/07/2021</a:t>
             </a:fld>
             <a:endParaRPr lang="en-GB" dirty="0"/>
           </a:p>
@@ -1610,7 +1611,7 @@
           <a:p>
             <a:fld id="{D3EAD725-27B8-4F5F-8F66-A02424069269}" type="datetimeFigureOut">
               <a:rPr lang="en-GB" smtClean="0"/>
-              <a:t>07/07/2021</a:t>
+              <a:t>08/07/2021</a:t>
             </a:fld>
             <a:endParaRPr lang="en-GB" dirty="0"/>
           </a:p>
@@ -1728,7 +1729,7 @@
           <a:p>
             <a:fld id="{D3EAD725-27B8-4F5F-8F66-A02424069269}" type="datetimeFigureOut">
               <a:rPr lang="en-GB" smtClean="0"/>
-              <a:t>07/07/2021</a:t>
+              <a:t>08/07/2021</a:t>
             </a:fld>
             <a:endParaRPr lang="en-GB" dirty="0"/>
           </a:p>
@@ -1823,7 +1824,7 @@
           <a:p>
             <a:fld id="{D3EAD725-27B8-4F5F-8F66-A02424069269}" type="datetimeFigureOut">
               <a:rPr lang="en-GB" smtClean="0"/>
-              <a:t>07/07/2021</a:t>
+              <a:t>08/07/2021</a:t>
             </a:fld>
             <a:endParaRPr lang="en-GB" dirty="0"/>
           </a:p>
@@ -2100,7 +2101,7 @@
           <a:p>
             <a:fld id="{D3EAD725-27B8-4F5F-8F66-A02424069269}" type="datetimeFigureOut">
               <a:rPr lang="en-GB" smtClean="0"/>
-              <a:t>07/07/2021</a:t>
+              <a:t>08/07/2021</a:t>
             </a:fld>
             <a:endParaRPr lang="en-GB" dirty="0"/>
           </a:p>
@@ -2356,7 +2357,7 @@
           <a:p>
             <a:fld id="{D3EAD725-27B8-4F5F-8F66-A02424069269}" type="datetimeFigureOut">
               <a:rPr lang="en-GB" smtClean="0"/>
-              <a:t>07/07/2021</a:t>
+              <a:t>08/07/2021</a:t>
             </a:fld>
             <a:endParaRPr lang="en-GB" dirty="0"/>
           </a:p>
@@ -2569,7 +2570,7 @@
           <a:p>
             <a:fld id="{D3EAD725-27B8-4F5F-8F66-A02424069269}" type="datetimeFigureOut">
               <a:rPr lang="en-GB" smtClean="0"/>
-              <a:t>07/07/2021</a:t>
+              <a:t>08/07/2021</a:t>
             </a:fld>
             <a:endParaRPr lang="en-GB" dirty="0"/>
           </a:p>
@@ -13921,6 +13922,601 @@
 </p:sld>
 </file>
 
+<file path=ppt/slides/slide4.xml><?xml version="1.0" encoding="utf-8"?>
+<p:sld xmlns:a="http://schemas.openxmlformats.org/drawingml/2006/main" xmlns:r="http://schemas.openxmlformats.org/officeDocument/2006/relationships" xmlns:p="http://schemas.openxmlformats.org/presentationml/2006/main">
+  <p:cSld>
+    <p:spTree>
+      <p:nvGrpSpPr>
+        <p:cNvPr id="1" name=""/>
+        <p:cNvGrpSpPr/>
+        <p:nvPr/>
+      </p:nvGrpSpPr>
+      <p:grpSpPr>
+        <a:xfrm>
+          <a:off x="0" y="0"/>
+          <a:ext cx="0" cy="0"/>
+          <a:chOff x="0" y="0"/>
+          <a:chExt cx="0" cy="0"/>
+        </a:xfrm>
+      </p:grpSpPr>
+      <p:sp>
+        <p:nvSpPr>
+          <p:cNvPr id="7" name="Rectangle 6">
+            <a:extLst>
+              <a:ext uri="{FF2B5EF4-FFF2-40B4-BE49-F238E27FC236}">
+                <a16:creationId xmlns:a16="http://schemas.microsoft.com/office/drawing/2014/main" id="{E0517053-4DA0-4B8A-A6CC-C4FA81099E72}"/>
+              </a:ext>
+            </a:extLst>
+          </p:cNvPr>
+          <p:cNvSpPr/>
+          <p:nvPr/>
+        </p:nvSpPr>
+        <p:spPr>
+          <a:xfrm>
+            <a:off x="3589867" y="1193800"/>
+            <a:ext cx="3175000" cy="3175000"/>
+          </a:xfrm>
+          <a:prstGeom prst="rect">
+            <a:avLst/>
+          </a:prstGeom>
+          <a:solidFill>
+            <a:schemeClr val="tx1"/>
+          </a:solidFill>
+          <a:ln>
+            <a:noFill/>
+          </a:ln>
+        </p:spPr>
+        <p:style>
+          <a:lnRef idx="2">
+            <a:schemeClr val="accent1">
+              <a:shade val="50000"/>
+            </a:schemeClr>
+          </a:lnRef>
+          <a:fillRef idx="1">
+            <a:schemeClr val="accent1"/>
+          </a:fillRef>
+          <a:effectRef idx="0">
+            <a:schemeClr val="accent1"/>
+          </a:effectRef>
+          <a:fontRef idx="minor">
+            <a:schemeClr val="lt1"/>
+          </a:fontRef>
+        </p:style>
+        <p:txBody>
+          <a:bodyPr rtlCol="0" anchor="ctr"/>
+          <a:lstStyle/>
+          <a:p>
+            <a:pPr algn="ctr"/>
+            <a:endParaRPr lang="en-GB"/>
+          </a:p>
+        </p:txBody>
+      </p:sp>
+      <p:sp>
+        <p:nvSpPr>
+          <p:cNvPr id="4" name="Rectangle 3">
+            <a:extLst>
+              <a:ext uri="{FF2B5EF4-FFF2-40B4-BE49-F238E27FC236}">
+                <a16:creationId xmlns:a16="http://schemas.microsoft.com/office/drawing/2014/main" id="{E44DB192-0923-4D08-8C1D-C40E8AFD745E}"/>
+              </a:ext>
+            </a:extLst>
+          </p:cNvPr>
+          <p:cNvSpPr/>
+          <p:nvPr/>
+        </p:nvSpPr>
+        <p:spPr>
+          <a:xfrm>
+            <a:off x="3589867" y="2768599"/>
+            <a:ext cx="3141133" cy="1600201"/>
+          </a:xfrm>
+          <a:prstGeom prst="rect">
+            <a:avLst/>
+          </a:prstGeom>
+          <a:solidFill>
+            <a:schemeClr val="tx1"/>
+          </a:solidFill>
+          <a:ln>
+            <a:noFill/>
+          </a:ln>
+        </p:spPr>
+        <p:style>
+          <a:lnRef idx="2">
+            <a:schemeClr val="accent4">
+              <a:shade val="50000"/>
+            </a:schemeClr>
+          </a:lnRef>
+          <a:fillRef idx="1">
+            <a:schemeClr val="accent4"/>
+          </a:fillRef>
+          <a:effectRef idx="0">
+            <a:schemeClr val="accent4"/>
+          </a:effectRef>
+          <a:fontRef idx="minor">
+            <a:schemeClr val="lt1"/>
+          </a:fontRef>
+        </p:style>
+        <p:txBody>
+          <a:bodyPr rtlCol="0" anchor="ctr"/>
+          <a:lstStyle/>
+          <a:p>
+            <a:endParaRPr lang="en-GB" sz="1200" dirty="0"/>
+          </a:p>
+          <a:p>
+            <a:endParaRPr lang="en-GB" sz="1200" dirty="0"/>
+          </a:p>
+          <a:p>
+            <a:endParaRPr lang="en-GB" sz="1200" dirty="0"/>
+          </a:p>
+          <a:p>
+            <a:r>
+              <a:rPr lang="en-GB" sz="1200" dirty="0"/>
+              <a:t>Super VAE-rio Bros. is a system for generating Super Mario levels whilst observing player preferences for quality and novelty.</a:t>
+            </a:r>
+          </a:p>
+          <a:p>
+            <a:endParaRPr lang="en-GB" sz="1200" dirty="0"/>
+          </a:p>
+        </p:txBody>
+      </p:sp>
+      <p:pic>
+        <p:nvPicPr>
+          <p:cNvPr id="5" name="Picture 4">
+            <a:extLst>
+              <a:ext uri="{FF2B5EF4-FFF2-40B4-BE49-F238E27FC236}">
+                <a16:creationId xmlns:a16="http://schemas.microsoft.com/office/drawing/2014/main" id="{FB2750C5-A9C3-4A7B-AA17-A26BAD358F55}"/>
+              </a:ext>
+            </a:extLst>
+          </p:cNvPr>
+          <p:cNvPicPr>
+            <a:picLocks noChangeAspect="1"/>
+          </p:cNvPicPr>
+          <p:nvPr/>
+        </p:nvPicPr>
+        <p:blipFill>
+          <a:blip r:embed="rId2">
+            <a:extLst>
+              <a:ext uri="{28A0092B-C50C-407E-A947-70E740481C1C}">
+                <a14:useLocalDpi xmlns:a14="http://schemas.microsoft.com/office/drawing/2010/main" val="0"/>
+              </a:ext>
+            </a:extLst>
+          </a:blip>
+          <a:stretch>
+            <a:fillRect/>
+          </a:stretch>
+        </p:blipFill>
+        <p:spPr>
+          <a:xfrm>
+            <a:off x="3783101" y="1464200"/>
+            <a:ext cx="2812433" cy="194849"/>
+          </a:xfrm>
+          <a:prstGeom prst="rect">
+            <a:avLst/>
+          </a:prstGeom>
+        </p:spPr>
+      </p:pic>
+      <p:grpSp>
+        <p:nvGrpSpPr>
+          <p:cNvPr id="8" name="Group 7">
+            <a:extLst>
+              <a:ext uri="{FF2B5EF4-FFF2-40B4-BE49-F238E27FC236}">
+                <a16:creationId xmlns:a16="http://schemas.microsoft.com/office/drawing/2014/main" id="{85890D75-031B-4A50-8DFC-C271AC1E89D4}"/>
+              </a:ext>
+            </a:extLst>
+          </p:cNvPr>
+          <p:cNvGrpSpPr/>
+          <p:nvPr/>
+        </p:nvGrpSpPr>
+        <p:grpSpPr>
+          <a:xfrm>
+            <a:off x="3709179" y="1983698"/>
+            <a:ext cx="916050" cy="1016779"/>
+            <a:chOff x="3197616" y="128311"/>
+            <a:chExt cx="916050" cy="1016779"/>
+          </a:xfrm>
+        </p:grpSpPr>
+        <p:pic>
+          <p:nvPicPr>
+            <p:cNvPr id="9" name="Picture 8" descr="Shape&#10;&#10;Description automatically generated with low confidence">
+              <a:extLst>
+                <a:ext uri="{FF2B5EF4-FFF2-40B4-BE49-F238E27FC236}">
+                  <a16:creationId xmlns:a16="http://schemas.microsoft.com/office/drawing/2014/main" id="{3BA0C3BB-A8E4-433E-BB1F-C408F85E2210}"/>
+                </a:ext>
+              </a:extLst>
+            </p:cNvPr>
+            <p:cNvPicPr>
+              <a:picLocks noChangeAspect="1"/>
+            </p:cNvPicPr>
+            <p:nvPr/>
+          </p:nvPicPr>
+          <p:blipFill>
+            <a:blip r:embed="rId3">
+              <a:duotone>
+                <a:schemeClr val="accent5">
+                  <a:shade val="45000"/>
+                  <a:satMod val="135000"/>
+                </a:schemeClr>
+                <a:prstClr val="white"/>
+              </a:duotone>
+              <a:extLst>
+                <a:ext uri="{28A0092B-C50C-407E-A947-70E740481C1C}">
+                  <a14:useLocalDpi xmlns:a14="http://schemas.microsoft.com/office/drawing/2010/main" val="0"/>
+                </a:ext>
+              </a:extLst>
+            </a:blip>
+            <a:stretch>
+              <a:fillRect/>
+            </a:stretch>
+          </p:blipFill>
+          <p:spPr>
+            <a:xfrm>
+              <a:off x="3197616" y="229040"/>
+              <a:ext cx="916050" cy="916050"/>
+            </a:xfrm>
+            <a:prstGeom prst="rect">
+              <a:avLst/>
+            </a:prstGeom>
+          </p:spPr>
+        </p:pic>
+        <p:pic>
+          <p:nvPicPr>
+            <p:cNvPr id="10" name="Picture 9" descr="Shape&#10;&#10;Description automatically generated with low confidence">
+              <a:extLst>
+                <a:ext uri="{FF2B5EF4-FFF2-40B4-BE49-F238E27FC236}">
+                  <a16:creationId xmlns:a16="http://schemas.microsoft.com/office/drawing/2014/main" id="{ED427F02-0CBA-4DCB-855F-5D5871E04F06}"/>
+                </a:ext>
+              </a:extLst>
+            </p:cNvPr>
+            <p:cNvPicPr>
+              <a:picLocks noChangeAspect="1"/>
+            </p:cNvPicPr>
+            <p:nvPr/>
+          </p:nvPicPr>
+          <p:blipFill rotWithShape="1">
+            <a:blip r:embed="rId3">
+              <a:duotone>
+                <a:schemeClr val="accent4">
+                  <a:shade val="45000"/>
+                  <a:satMod val="135000"/>
+                </a:schemeClr>
+                <a:prstClr val="white"/>
+              </a:duotone>
+              <a:extLst>
+                <a:ext uri="{28A0092B-C50C-407E-A947-70E740481C1C}">
+                  <a14:useLocalDpi xmlns:a14="http://schemas.microsoft.com/office/drawing/2010/main" val="0"/>
+                </a:ext>
+              </a:extLst>
+            </a:blip>
+            <a:srcRect l="23535" r="23479" b="49487"/>
+            <a:stretch/>
+          </p:blipFill>
+          <p:spPr>
+            <a:xfrm>
+              <a:off x="3413218" y="229040"/>
+              <a:ext cx="485368" cy="462727"/>
+            </a:xfrm>
+            <a:prstGeom prst="rect">
+              <a:avLst/>
+            </a:prstGeom>
+          </p:spPr>
+        </p:pic>
+        <p:sp>
+          <p:nvSpPr>
+            <p:cNvPr id="11" name="Rectangle 10">
+              <a:extLst>
+                <a:ext uri="{FF2B5EF4-FFF2-40B4-BE49-F238E27FC236}">
+                  <a16:creationId xmlns:a16="http://schemas.microsoft.com/office/drawing/2014/main" id="{1C3B80FC-9DD8-47DD-9EC9-B63E03C607B2}"/>
+                </a:ext>
+              </a:extLst>
+            </p:cNvPr>
+            <p:cNvSpPr/>
+            <p:nvPr/>
+          </p:nvSpPr>
+          <p:spPr>
+            <a:xfrm>
+              <a:off x="3413218" y="691767"/>
+              <a:ext cx="102787" cy="448621"/>
+            </a:xfrm>
+            <a:prstGeom prst="rect">
+              <a:avLst/>
+            </a:prstGeom>
+            <a:solidFill>
+              <a:srgbClr val="004F87"/>
+            </a:solidFill>
+            <a:ln>
+              <a:solidFill>
+                <a:srgbClr val="004F87"/>
+              </a:solidFill>
+            </a:ln>
+          </p:spPr>
+          <p:style>
+            <a:lnRef idx="2">
+              <a:schemeClr val="accent1">
+                <a:shade val="50000"/>
+              </a:schemeClr>
+            </a:lnRef>
+            <a:fillRef idx="1">
+              <a:schemeClr val="accent1"/>
+            </a:fillRef>
+            <a:effectRef idx="0">
+              <a:schemeClr val="accent1"/>
+            </a:effectRef>
+            <a:fontRef idx="minor">
+              <a:schemeClr val="lt1"/>
+            </a:fontRef>
+          </p:style>
+          <p:txBody>
+            <a:bodyPr rtlCol="0" anchor="ctr"/>
+            <a:lstStyle/>
+            <a:p>
+              <a:pPr algn="ctr"/>
+              <a:endParaRPr lang="en-GB" dirty="0"/>
+            </a:p>
+          </p:txBody>
+        </p:sp>
+        <p:sp>
+          <p:nvSpPr>
+            <p:cNvPr id="12" name="Rectangle 11">
+              <a:extLst>
+                <a:ext uri="{FF2B5EF4-FFF2-40B4-BE49-F238E27FC236}">
+                  <a16:creationId xmlns:a16="http://schemas.microsoft.com/office/drawing/2014/main" id="{A73C0BA1-423D-487B-B0BD-14C4020967B3}"/>
+                </a:ext>
+              </a:extLst>
+            </p:cNvPr>
+            <p:cNvSpPr/>
+            <p:nvPr/>
+          </p:nvSpPr>
+          <p:spPr>
+            <a:xfrm>
+              <a:off x="3795277" y="687065"/>
+              <a:ext cx="102787" cy="448621"/>
+            </a:xfrm>
+            <a:prstGeom prst="rect">
+              <a:avLst/>
+            </a:prstGeom>
+            <a:solidFill>
+              <a:srgbClr val="004F87"/>
+            </a:solidFill>
+            <a:ln>
+              <a:solidFill>
+                <a:srgbClr val="004F87"/>
+              </a:solidFill>
+            </a:ln>
+          </p:spPr>
+          <p:style>
+            <a:lnRef idx="2">
+              <a:schemeClr val="accent1">
+                <a:shade val="50000"/>
+              </a:schemeClr>
+            </a:lnRef>
+            <a:fillRef idx="1">
+              <a:schemeClr val="accent1"/>
+            </a:fillRef>
+            <a:effectRef idx="0">
+              <a:schemeClr val="accent1"/>
+            </a:effectRef>
+            <a:fontRef idx="minor">
+              <a:schemeClr val="lt1"/>
+            </a:fontRef>
+          </p:style>
+          <p:txBody>
+            <a:bodyPr rtlCol="0" anchor="ctr"/>
+            <a:lstStyle/>
+            <a:p>
+              <a:pPr algn="ctr"/>
+              <a:endParaRPr lang="en-GB" dirty="0"/>
+            </a:p>
+          </p:txBody>
+        </p:sp>
+        <p:sp>
+          <p:nvSpPr>
+            <p:cNvPr id="13" name="Oval 12">
+              <a:extLst>
+                <a:ext uri="{FF2B5EF4-FFF2-40B4-BE49-F238E27FC236}">
+                  <a16:creationId xmlns:a16="http://schemas.microsoft.com/office/drawing/2014/main" id="{4502FC9D-640A-4BDA-AEA0-1500297C1B9D}"/>
+                </a:ext>
+              </a:extLst>
+            </p:cNvPr>
+            <p:cNvSpPr/>
+            <p:nvPr/>
+          </p:nvSpPr>
+          <p:spPr>
+            <a:xfrm>
+              <a:off x="3413218" y="184730"/>
+              <a:ext cx="484846" cy="194977"/>
+            </a:xfrm>
+            <a:prstGeom prst="ellipse">
+              <a:avLst/>
+            </a:prstGeom>
+            <a:solidFill>
+              <a:srgbClr val="932900"/>
+            </a:solidFill>
+            <a:ln>
+              <a:solidFill>
+                <a:srgbClr val="932900"/>
+              </a:solidFill>
+            </a:ln>
+          </p:spPr>
+          <p:style>
+            <a:lnRef idx="2">
+              <a:schemeClr val="accent1">
+                <a:shade val="50000"/>
+              </a:schemeClr>
+            </a:lnRef>
+            <a:fillRef idx="1">
+              <a:schemeClr val="accent1"/>
+            </a:fillRef>
+            <a:effectRef idx="0">
+              <a:schemeClr val="accent1"/>
+            </a:effectRef>
+            <a:fontRef idx="minor">
+              <a:schemeClr val="lt1"/>
+            </a:fontRef>
+          </p:style>
+          <p:txBody>
+            <a:bodyPr rtlCol="0" anchor="ctr"/>
+            <a:lstStyle/>
+            <a:p>
+              <a:pPr algn="ctr"/>
+              <a:endParaRPr lang="en-GB" dirty="0"/>
+            </a:p>
+          </p:txBody>
+        </p:sp>
+        <p:sp>
+          <p:nvSpPr>
+            <p:cNvPr id="14" name="Oval 13">
+              <a:extLst>
+                <a:ext uri="{FF2B5EF4-FFF2-40B4-BE49-F238E27FC236}">
+                  <a16:creationId xmlns:a16="http://schemas.microsoft.com/office/drawing/2014/main" id="{3765C584-4205-4E15-8B83-98086C122E26}"/>
+                </a:ext>
+              </a:extLst>
+            </p:cNvPr>
+            <p:cNvSpPr/>
+            <p:nvPr/>
+          </p:nvSpPr>
+          <p:spPr>
+            <a:xfrm>
+              <a:off x="3482295" y="128311"/>
+              <a:ext cx="346692" cy="194977"/>
+            </a:xfrm>
+            <a:prstGeom prst="ellipse">
+              <a:avLst/>
+            </a:prstGeom>
+            <a:solidFill>
+              <a:srgbClr val="932900"/>
+            </a:solidFill>
+            <a:ln>
+              <a:solidFill>
+                <a:srgbClr val="932900"/>
+              </a:solidFill>
+            </a:ln>
+          </p:spPr>
+          <p:style>
+            <a:lnRef idx="2">
+              <a:schemeClr val="accent1">
+                <a:shade val="50000"/>
+              </a:schemeClr>
+            </a:lnRef>
+            <a:fillRef idx="1">
+              <a:schemeClr val="accent1"/>
+            </a:fillRef>
+            <a:effectRef idx="0">
+              <a:schemeClr val="accent1"/>
+            </a:effectRef>
+            <a:fontRef idx="minor">
+              <a:schemeClr val="lt1"/>
+            </a:fontRef>
+          </p:style>
+          <p:txBody>
+            <a:bodyPr rtlCol="0" anchor="ctr"/>
+            <a:lstStyle/>
+            <a:p>
+              <a:pPr algn="ctr"/>
+              <a:endParaRPr lang="en-GB" dirty="0"/>
+            </a:p>
+          </p:txBody>
+        </p:sp>
+        <p:sp>
+          <p:nvSpPr>
+            <p:cNvPr id="15" name="Rectangle 14">
+              <a:extLst>
+                <a:ext uri="{FF2B5EF4-FFF2-40B4-BE49-F238E27FC236}">
+                  <a16:creationId xmlns:a16="http://schemas.microsoft.com/office/drawing/2014/main" id="{DB4F0DE9-1591-469B-BE11-3CF62AE37B1E}"/>
+                </a:ext>
+              </a:extLst>
+            </p:cNvPr>
+            <p:cNvSpPr/>
+            <p:nvPr/>
+          </p:nvSpPr>
+          <p:spPr>
+            <a:xfrm rot="5400000">
+              <a:off x="3534498" y="792584"/>
+              <a:ext cx="242286" cy="448621"/>
+            </a:xfrm>
+            <a:prstGeom prst="rect">
+              <a:avLst/>
+            </a:prstGeom>
+            <a:solidFill>
+              <a:srgbClr val="004F87"/>
+            </a:solidFill>
+            <a:ln>
+              <a:solidFill>
+                <a:srgbClr val="004F87"/>
+              </a:solidFill>
+            </a:ln>
+          </p:spPr>
+          <p:style>
+            <a:lnRef idx="2">
+              <a:schemeClr val="accent1">
+                <a:shade val="50000"/>
+              </a:schemeClr>
+            </a:lnRef>
+            <a:fillRef idx="1">
+              <a:schemeClr val="accent1"/>
+            </a:fillRef>
+            <a:effectRef idx="0">
+              <a:schemeClr val="accent1"/>
+            </a:effectRef>
+            <a:fontRef idx="minor">
+              <a:schemeClr val="lt1"/>
+            </a:fontRef>
+          </p:style>
+          <p:txBody>
+            <a:bodyPr rtlCol="0" anchor="ctr"/>
+            <a:lstStyle/>
+            <a:p>
+              <a:pPr algn="ctr"/>
+              <a:endParaRPr lang="en-GB" dirty="0"/>
+            </a:p>
+          </p:txBody>
+        </p:sp>
+      </p:grpSp>
+      <p:pic>
+        <p:nvPicPr>
+          <p:cNvPr id="17" name="Picture 16" descr="A screenshot of a computer&#10;&#10;Description automatically generated with low confidence">
+            <a:extLst>
+              <a:ext uri="{FF2B5EF4-FFF2-40B4-BE49-F238E27FC236}">
+                <a16:creationId xmlns:a16="http://schemas.microsoft.com/office/drawing/2014/main" id="{5DBCFAF4-8E68-4971-BFD1-530C60C0B67D}"/>
+              </a:ext>
+            </a:extLst>
+          </p:cNvPr>
+          <p:cNvPicPr>
+            <a:picLocks noChangeAspect="1"/>
+          </p:cNvPicPr>
+          <p:nvPr/>
+        </p:nvPicPr>
+        <p:blipFill rotWithShape="1">
+          <a:blip r:embed="rId4">
+            <a:extLst>
+              <a:ext uri="{28A0092B-C50C-407E-A947-70E740481C1C}">
+                <a14:useLocalDpi xmlns:a14="http://schemas.microsoft.com/office/drawing/2010/main" val="0"/>
+              </a:ext>
+            </a:extLst>
+          </a:blip>
+          <a:srcRect l="5333" t="10693" r="5389" b="33659"/>
+          <a:stretch/>
+        </p:blipFill>
+        <p:spPr>
+          <a:xfrm>
+            <a:off x="4694306" y="1968392"/>
+            <a:ext cx="1966583" cy="532121"/>
+          </a:xfrm>
+          <a:prstGeom prst="rect">
+            <a:avLst/>
+          </a:prstGeom>
+        </p:spPr>
+      </p:pic>
+    </p:spTree>
+    <p:extLst>
+      <p:ext uri="{BB962C8B-B14F-4D97-AF65-F5344CB8AC3E}">
+        <p14:creationId xmlns:p14="http://schemas.microsoft.com/office/powerpoint/2010/main" val="1310274507"/>
+      </p:ext>
+    </p:extLst>
+  </p:cSld>
+  <p:clrMapOvr>
+    <a:masterClrMapping/>
+  </p:clrMapOvr>
+</p:sld>
+</file>
+
 <file path=ppt/theme/theme1.xml><?xml version="1.0" encoding="utf-8"?>
 <a:theme xmlns:a="http://schemas.openxmlformats.org/drawingml/2006/main" name="Office Theme">
   <a:themeElements>

</xml_diff>